<commit_message>
Add tally and sa checkpoint info
</commit_message>
<xml_diff>
--- a/bwt-and-fm-index.pptx
+++ b/bwt-and-fm-index.pptx
@@ -21549,6 +21549,57 @@
           </a:graphicData>
         </a:graphic>
       </p:graphicFrame>
+      <p:sp>
+        <p:nvSpPr>
+          <p:cNvPr id="3" name="TextBox 2">
+            <a:extLst>
+              <a:ext uri="{FF2B5EF4-FFF2-40B4-BE49-F238E27FC236}">
+                <a16:creationId xmlns:a16="http://schemas.microsoft.com/office/drawing/2014/main" id="{938DD106-3CE3-83CC-1C79-3BD0A7EA514E}"/>
+              </a:ext>
+            </a:extLst>
+          </p:cNvPr>
+          <p:cNvSpPr txBox="1"/>
+          <p:nvPr/>
+        </p:nvSpPr>
+        <p:spPr>
+          <a:xfrm>
+            <a:off x="8780016" y="704740"/>
+            <a:ext cx="2890278" cy="523220"/>
+          </a:xfrm>
+          <a:prstGeom prst="rect">
+            <a:avLst/>
+          </a:prstGeom>
+          <a:noFill/>
+        </p:spPr>
+        <p:txBody>
+          <a:bodyPr wrap="none" rtlCol="0">
+            <a:spAutoFit/>
+          </a:bodyPr>
+          <a:lstStyle/>
+          <a:p>
+            <a:r>
+              <a:rPr lang="en-US" sz="1400" dirty="0">
+                <a:latin typeface="Times New Roman" panose="02020603050405020304" pitchFamily="18" charset="0"/>
+                <a:cs typeface="Times New Roman" panose="02020603050405020304" pitchFamily="18" charset="0"/>
+              </a:rPr>
+              <a:t>TALLY CHECKPOINT: 128</a:t>
+            </a:r>
+          </a:p>
+          <a:p>
+            <a:r>
+              <a:rPr lang="en-US" sz="1400" dirty="0">
+                <a:latin typeface="Times New Roman" panose="02020603050405020304" pitchFamily="18" charset="0"/>
+                <a:cs typeface="Times New Roman" panose="02020603050405020304" pitchFamily="18" charset="0"/>
+              </a:rPr>
+              <a:t>SUFFIX ARRAY CHECKPOINT: 16</a:t>
+            </a:r>
+            <a:endParaRPr lang="LID4096" sz="1400" dirty="0">
+              <a:latin typeface="Times New Roman" panose="02020603050405020304" pitchFamily="18" charset="0"/>
+              <a:cs typeface="Times New Roman" panose="02020603050405020304" pitchFamily="18" charset="0"/>
+            </a:endParaRPr>
+          </a:p>
+        </p:txBody>
+      </p:sp>
     </p:spTree>
     <p:extLst>
       <p:ext uri="{BB962C8B-B14F-4D97-AF65-F5344CB8AC3E}">
@@ -21781,6 +21832,57 @@
           </a:graphicData>
         </a:graphic>
       </p:graphicFrame>
+      <p:sp>
+        <p:nvSpPr>
+          <p:cNvPr id="8" name="TextBox 7">
+            <a:extLst>
+              <a:ext uri="{FF2B5EF4-FFF2-40B4-BE49-F238E27FC236}">
+                <a16:creationId xmlns:a16="http://schemas.microsoft.com/office/drawing/2014/main" id="{75B18E2D-833A-FEAC-02C5-4CF2D7396D98}"/>
+              </a:ext>
+            </a:extLst>
+          </p:cNvPr>
+          <p:cNvSpPr txBox="1"/>
+          <p:nvPr/>
+        </p:nvSpPr>
+        <p:spPr>
+          <a:xfrm>
+            <a:off x="9008504" y="766296"/>
+            <a:ext cx="2943351" cy="523220"/>
+          </a:xfrm>
+          <a:prstGeom prst="rect">
+            <a:avLst/>
+          </a:prstGeom>
+          <a:noFill/>
+        </p:spPr>
+        <p:txBody>
+          <a:bodyPr wrap="square">
+            <a:spAutoFit/>
+          </a:bodyPr>
+          <a:lstStyle/>
+          <a:p>
+            <a:r>
+              <a:rPr lang="en-US" sz="1400" dirty="0">
+                <a:latin typeface="Times New Roman" panose="02020603050405020304" pitchFamily="18" charset="0"/>
+                <a:cs typeface="Times New Roman" panose="02020603050405020304" pitchFamily="18" charset="0"/>
+              </a:rPr>
+              <a:t>TALLY CHECKPOINT: 128</a:t>
+            </a:r>
+          </a:p>
+          <a:p>
+            <a:r>
+              <a:rPr lang="en-US" sz="1400" dirty="0">
+                <a:latin typeface="Times New Roman" panose="02020603050405020304" pitchFamily="18" charset="0"/>
+                <a:cs typeface="Times New Roman" panose="02020603050405020304" pitchFamily="18" charset="0"/>
+              </a:rPr>
+              <a:t>SUFFIX ARRAY CHECKPOINT: 16</a:t>
+            </a:r>
+            <a:endParaRPr lang="LID4096" sz="1400" dirty="0">
+              <a:latin typeface="Times New Roman" panose="02020603050405020304" pitchFamily="18" charset="0"/>
+              <a:cs typeface="Times New Roman" panose="02020603050405020304" pitchFamily="18" charset="0"/>
+            </a:endParaRPr>
+          </a:p>
+        </p:txBody>
+      </p:sp>
     </p:spTree>
     <p:extLst>
       <p:ext uri="{BB962C8B-B14F-4D97-AF65-F5344CB8AC3E}">
@@ -22013,6 +22115,57 @@
           </a:graphicData>
         </a:graphic>
       </p:graphicFrame>
+      <p:sp>
+        <p:nvSpPr>
+          <p:cNvPr id="4" name="TextBox 3">
+            <a:extLst>
+              <a:ext uri="{FF2B5EF4-FFF2-40B4-BE49-F238E27FC236}">
+                <a16:creationId xmlns:a16="http://schemas.microsoft.com/office/drawing/2014/main" id="{08A2A503-7C61-D3A3-4B79-55AF89766ADB}"/>
+              </a:ext>
+            </a:extLst>
+          </p:cNvPr>
+          <p:cNvSpPr txBox="1"/>
+          <p:nvPr/>
+        </p:nvSpPr>
+        <p:spPr>
+          <a:xfrm>
+            <a:off x="8891155" y="766296"/>
+            <a:ext cx="2881745" cy="523220"/>
+          </a:xfrm>
+          <a:prstGeom prst="rect">
+            <a:avLst/>
+          </a:prstGeom>
+          <a:noFill/>
+        </p:spPr>
+        <p:txBody>
+          <a:bodyPr wrap="square">
+            <a:spAutoFit/>
+          </a:bodyPr>
+          <a:lstStyle/>
+          <a:p>
+            <a:r>
+              <a:rPr lang="en-US" sz="1400" dirty="0">
+                <a:latin typeface="Times New Roman" panose="02020603050405020304" pitchFamily="18" charset="0"/>
+                <a:cs typeface="Times New Roman" panose="02020603050405020304" pitchFamily="18" charset="0"/>
+              </a:rPr>
+              <a:t>TALLY CHECKPOINT: 128</a:t>
+            </a:r>
+          </a:p>
+          <a:p>
+            <a:r>
+              <a:rPr lang="en-US" sz="1400" dirty="0">
+                <a:latin typeface="Times New Roman" panose="02020603050405020304" pitchFamily="18" charset="0"/>
+                <a:cs typeface="Times New Roman" panose="02020603050405020304" pitchFamily="18" charset="0"/>
+              </a:rPr>
+              <a:t>SUFFIX ARRAY CHECKPOINT: 16</a:t>
+            </a:r>
+            <a:endParaRPr lang="LID4096" sz="1400" dirty="0">
+              <a:latin typeface="Times New Roman" panose="02020603050405020304" pitchFamily="18" charset="0"/>
+              <a:cs typeface="Times New Roman" panose="02020603050405020304" pitchFamily="18" charset="0"/>
+            </a:endParaRPr>
+          </a:p>
+        </p:txBody>
+      </p:sp>
     </p:spTree>
     <p:extLst>
       <p:ext uri="{BB962C8B-B14F-4D97-AF65-F5344CB8AC3E}">

</xml_diff>